<commit_message>
updated ppt & rp
</commit_message>
<xml_diff>
--- a/MANOBAL PPT.pptx
+++ b/MANOBAL PPT.pptx
@@ -5,10 +5,10 @@
     <p:sldMasterId id="2147483696" r:id="rId4"/>
   </p:sldMasterIdLst>
   <p:notesMasterIdLst>
-    <p:notesMasterId r:id="rId17"/>
+    <p:notesMasterId r:id="rId18"/>
   </p:notesMasterIdLst>
   <p:handoutMasterIdLst>
-    <p:handoutMasterId r:id="rId18"/>
+    <p:handoutMasterId r:id="rId19"/>
   </p:handoutMasterIdLst>
   <p:sldIdLst>
     <p:sldId id="334" r:id="rId5"/>
@@ -18,11 +18,12 @@
     <p:sldId id="342" r:id="rId9"/>
     <p:sldId id="336" r:id="rId10"/>
     <p:sldId id="350" r:id="rId11"/>
-    <p:sldId id="351" r:id="rId12"/>
-    <p:sldId id="324" r:id="rId13"/>
-    <p:sldId id="346" r:id="rId14"/>
-    <p:sldId id="328" r:id="rId15"/>
-    <p:sldId id="349" r:id="rId16"/>
+    <p:sldId id="352" r:id="rId12"/>
+    <p:sldId id="351" r:id="rId13"/>
+    <p:sldId id="324" r:id="rId14"/>
+    <p:sldId id="346" r:id="rId15"/>
+    <p:sldId id="328" r:id="rId16"/>
+    <p:sldId id="349" r:id="rId17"/>
   </p:sldIdLst>
   <p:sldSz cx="12192000" cy="6858000"/>
   <p:notesSz cx="6858000" cy="9144000"/>
@@ -133,6 +134,7 @@
             <p14:sldId id="342"/>
             <p14:sldId id="336"/>
             <p14:sldId id="350"/>
+            <p14:sldId id="352"/>
             <p14:sldId id="351"/>
             <p14:sldId id="324"/>
             <p14:sldId id="346"/>
@@ -268,7 +270,7 @@
           <a:p>
             <a:fld id="{A3888634-FBA9-41D6-8B35-EE3A7D816B7C}" type="datetimeFigureOut">
               <a:rPr lang="en-US" smtClean="0"/>
-              <a:t>2/13/2025</a:t>
+              <a:t>2/14/2025</a:t>
             </a:fld>
             <a:endParaRPr lang="en-US" dirty="0"/>
           </a:p>
@@ -445,7 +447,7 @@
           <a:p>
             <a:fld id="{5EA28068-AFBD-4979-B752-9EB6F90B1386}" type="datetimeFigureOut">
               <a:rPr lang="en-US" smtClean="0"/>
-              <a:t>2/13/2025</a:t>
+              <a:t>2/14/2025</a:t>
             </a:fld>
             <a:endParaRPr lang="en-US" dirty="0"/>
           </a:p>
@@ -870,7 +872,7 @@
     </p:spTree>
     <p:extLst>
       <p:ext uri="{BB962C8B-B14F-4D97-AF65-F5344CB8AC3E}">
-        <p14:creationId xmlns:p14="http://schemas.microsoft.com/office/powerpoint/2010/main" val="28369859"/>
+        <p14:creationId xmlns:p14="http://schemas.microsoft.com/office/powerpoint/2010/main" val="2159706391"/>
       </p:ext>
     </p:extLst>
   </p:cSld>
@@ -954,7 +956,7 @@
     </p:spTree>
     <p:extLst>
       <p:ext uri="{BB962C8B-B14F-4D97-AF65-F5344CB8AC3E}">
-        <p14:creationId xmlns:p14="http://schemas.microsoft.com/office/powerpoint/2010/main" val="373993397"/>
+        <p14:creationId xmlns:p14="http://schemas.microsoft.com/office/powerpoint/2010/main" val="28369859"/>
       </p:ext>
     </p:extLst>
   </p:cSld>
@@ -1030,6 +1032,90 @@
             <a:fld id="{D5939589-3E79-4C82-AA4A-FE78234FAA59}" type="slidenum">
               <a:rPr lang="en-US" smtClean="0"/>
               <a:t>12</a:t>
+            </a:fld>
+            <a:endParaRPr lang="en-US" dirty="0"/>
+          </a:p>
+        </p:txBody>
+      </p:sp>
+    </p:spTree>
+    <p:extLst>
+      <p:ext uri="{BB962C8B-B14F-4D97-AF65-F5344CB8AC3E}">
+        <p14:creationId xmlns:p14="http://schemas.microsoft.com/office/powerpoint/2010/main" val="373993397"/>
+      </p:ext>
+    </p:extLst>
+  </p:cSld>
+  <p:clrMapOvr>
+    <a:masterClrMapping/>
+  </p:clrMapOvr>
+</p:notes>
+</file>
+
+<file path=ppt/notesSlides/notesSlide13.xml><?xml version="1.0" encoding="utf-8"?>
+<p:notes xmlns:a="http://schemas.openxmlformats.org/drawingml/2006/main" xmlns:r="http://schemas.openxmlformats.org/officeDocument/2006/relationships" xmlns:p="http://schemas.openxmlformats.org/presentationml/2006/main">
+  <p:cSld>
+    <p:spTree>
+      <p:nvGrpSpPr>
+        <p:cNvPr id="1" name=""/>
+        <p:cNvGrpSpPr/>
+        <p:nvPr/>
+      </p:nvGrpSpPr>
+      <p:grpSpPr>
+        <a:xfrm>
+          <a:off x="0" y="0"/>
+          <a:ext cx="0" cy="0"/>
+          <a:chOff x="0" y="0"/>
+          <a:chExt cx="0" cy="0"/>
+        </a:xfrm>
+      </p:grpSpPr>
+      <p:sp>
+        <p:nvSpPr>
+          <p:cNvPr id="2" name="Slide Image Placeholder 1"/>
+          <p:cNvSpPr>
+            <a:spLocks noGrp="1" noRot="1" noChangeAspect="1"/>
+          </p:cNvSpPr>
+          <p:nvPr>
+            <p:ph type="sldImg"/>
+          </p:nvPr>
+        </p:nvSpPr>
+        <p:spPr/>
+      </p:sp>
+      <p:sp>
+        <p:nvSpPr>
+          <p:cNvPr id="3" name="Notes Placeholder 2"/>
+          <p:cNvSpPr>
+            <a:spLocks noGrp="1"/>
+          </p:cNvSpPr>
+          <p:nvPr>
+            <p:ph type="body" idx="1"/>
+          </p:nvPr>
+        </p:nvSpPr>
+        <p:spPr/>
+        <p:txBody>
+          <a:bodyPr/>
+          <a:lstStyle/>
+          <a:p>
+            <a:endParaRPr lang="en-US" dirty="0"/>
+          </a:p>
+        </p:txBody>
+      </p:sp>
+      <p:sp>
+        <p:nvSpPr>
+          <p:cNvPr id="4" name="Slide Number Placeholder 3"/>
+          <p:cNvSpPr>
+            <a:spLocks noGrp="1"/>
+          </p:cNvSpPr>
+          <p:nvPr>
+            <p:ph type="sldNum" sz="quarter" idx="5"/>
+          </p:nvPr>
+        </p:nvSpPr>
+        <p:spPr/>
+        <p:txBody>
+          <a:bodyPr/>
+          <a:lstStyle/>
+          <a:p>
+            <a:fld id="{D5939589-3E79-4C82-AA4A-FE78234FAA59}" type="slidenum">
+              <a:rPr lang="en-US" smtClean="0"/>
+              <a:t>13</a:t>
             </a:fld>
             <a:endParaRPr lang="en-US" dirty="0"/>
           </a:p>
@@ -1584,6 +1670,114 @@
         <p:cNvPr id="1" name="">
           <a:extLst>
             <a:ext uri="{FF2B5EF4-FFF2-40B4-BE49-F238E27FC236}">
+              <a16:creationId xmlns:a16="http://schemas.microsoft.com/office/drawing/2014/main" id="{AE78527F-D5F5-7746-6605-DC61F987C2B5}"/>
+            </a:ext>
+          </a:extLst>
+        </p:cNvPr>
+        <p:cNvGrpSpPr/>
+        <p:nvPr/>
+      </p:nvGrpSpPr>
+      <p:grpSpPr>
+        <a:xfrm>
+          <a:off x="0" y="0"/>
+          <a:ext cx="0" cy="0"/>
+          <a:chOff x="0" y="0"/>
+          <a:chExt cx="0" cy="0"/>
+        </a:xfrm>
+      </p:grpSpPr>
+      <p:sp>
+        <p:nvSpPr>
+          <p:cNvPr id="2" name="Slide Image Placeholder 1">
+            <a:extLst>
+              <a:ext uri="{FF2B5EF4-FFF2-40B4-BE49-F238E27FC236}">
+                <a16:creationId xmlns:a16="http://schemas.microsoft.com/office/drawing/2014/main" id="{15C7C4E9-8E18-2ACE-9251-5EF3224C587E}"/>
+              </a:ext>
+            </a:extLst>
+          </p:cNvPr>
+          <p:cNvSpPr>
+            <a:spLocks noGrp="1" noRot="1" noChangeAspect="1"/>
+          </p:cNvSpPr>
+          <p:nvPr>
+            <p:ph type="sldImg"/>
+          </p:nvPr>
+        </p:nvSpPr>
+        <p:spPr/>
+      </p:sp>
+      <p:sp>
+        <p:nvSpPr>
+          <p:cNvPr id="3" name="Notes Placeholder 2">
+            <a:extLst>
+              <a:ext uri="{FF2B5EF4-FFF2-40B4-BE49-F238E27FC236}">
+                <a16:creationId xmlns:a16="http://schemas.microsoft.com/office/drawing/2014/main" id="{5CAE2192-DFE7-3BB7-3E65-CC5890E03EAB}"/>
+              </a:ext>
+            </a:extLst>
+          </p:cNvPr>
+          <p:cNvSpPr>
+            <a:spLocks noGrp="1"/>
+          </p:cNvSpPr>
+          <p:nvPr>
+            <p:ph type="body" idx="1"/>
+          </p:nvPr>
+        </p:nvSpPr>
+        <p:spPr/>
+        <p:txBody>
+          <a:bodyPr/>
+          <a:lstStyle/>
+          <a:p>
+            <a:endParaRPr lang="en-US" dirty="0"/>
+          </a:p>
+        </p:txBody>
+      </p:sp>
+      <p:sp>
+        <p:nvSpPr>
+          <p:cNvPr id="4" name="Slide Number Placeholder 3">
+            <a:extLst>
+              <a:ext uri="{FF2B5EF4-FFF2-40B4-BE49-F238E27FC236}">
+                <a16:creationId xmlns:a16="http://schemas.microsoft.com/office/drawing/2014/main" id="{0B2761E0-599D-898C-91BD-A20D8BA1E5F3}"/>
+              </a:ext>
+            </a:extLst>
+          </p:cNvPr>
+          <p:cNvSpPr>
+            <a:spLocks noGrp="1"/>
+          </p:cNvSpPr>
+          <p:nvPr>
+            <p:ph type="sldNum" sz="quarter" idx="5"/>
+          </p:nvPr>
+        </p:nvSpPr>
+        <p:spPr/>
+        <p:txBody>
+          <a:bodyPr/>
+          <a:lstStyle/>
+          <a:p>
+            <a:fld id="{D5939589-3E79-4C82-AA4A-FE78234FAA59}" type="slidenum">
+              <a:rPr lang="en-US" smtClean="0"/>
+              <a:t>8</a:t>
+            </a:fld>
+            <a:endParaRPr lang="en-US" dirty="0"/>
+          </a:p>
+        </p:txBody>
+      </p:sp>
+    </p:spTree>
+    <p:extLst>
+      <p:ext uri="{BB962C8B-B14F-4D97-AF65-F5344CB8AC3E}">
+        <p14:creationId xmlns:p14="http://schemas.microsoft.com/office/powerpoint/2010/main" val="3582533004"/>
+      </p:ext>
+    </p:extLst>
+  </p:cSld>
+  <p:clrMapOvr>
+    <a:masterClrMapping/>
+  </p:clrMapOvr>
+</p:notes>
+</file>
+
+<file path=ppt/notesSlides/notesSlide9.xml><?xml version="1.0" encoding="utf-8"?>
+<p:notes xmlns:a="http://schemas.openxmlformats.org/drawingml/2006/main" xmlns:r="http://schemas.openxmlformats.org/officeDocument/2006/relationships" xmlns:p="http://schemas.openxmlformats.org/presentationml/2006/main">
+  <p:cSld>
+    <p:spTree>
+      <p:nvGrpSpPr>
+        <p:cNvPr id="1" name="">
+          <a:extLst>
+            <a:ext uri="{FF2B5EF4-FFF2-40B4-BE49-F238E27FC236}">
               <a16:creationId xmlns:a16="http://schemas.microsoft.com/office/drawing/2014/main" id="{69AC1B4F-A9AA-7253-C41C-5755CEDD11B3}"/>
             </a:ext>
           </a:extLst>
@@ -1665,7 +1859,7 @@
           <a:p>
             <a:fld id="{D5939589-3E79-4C82-AA4A-FE78234FAA59}" type="slidenum">
               <a:rPr lang="en-US" smtClean="0"/>
-              <a:t>8</a:t>
+              <a:t>9</a:t>
             </a:fld>
             <a:endParaRPr lang="en-US" dirty="0"/>
           </a:p>
@@ -1675,90 +1869,6 @@
     <p:extLst>
       <p:ext uri="{BB962C8B-B14F-4D97-AF65-F5344CB8AC3E}">
         <p14:creationId xmlns:p14="http://schemas.microsoft.com/office/powerpoint/2010/main" val="232057882"/>
-      </p:ext>
-    </p:extLst>
-  </p:cSld>
-  <p:clrMapOvr>
-    <a:masterClrMapping/>
-  </p:clrMapOvr>
-</p:notes>
-</file>
-
-<file path=ppt/notesSlides/notesSlide9.xml><?xml version="1.0" encoding="utf-8"?>
-<p:notes xmlns:a="http://schemas.openxmlformats.org/drawingml/2006/main" xmlns:r="http://schemas.openxmlformats.org/officeDocument/2006/relationships" xmlns:p="http://schemas.openxmlformats.org/presentationml/2006/main">
-  <p:cSld>
-    <p:spTree>
-      <p:nvGrpSpPr>
-        <p:cNvPr id="1" name=""/>
-        <p:cNvGrpSpPr/>
-        <p:nvPr/>
-      </p:nvGrpSpPr>
-      <p:grpSpPr>
-        <a:xfrm>
-          <a:off x="0" y="0"/>
-          <a:ext cx="0" cy="0"/>
-          <a:chOff x="0" y="0"/>
-          <a:chExt cx="0" cy="0"/>
-        </a:xfrm>
-      </p:grpSpPr>
-      <p:sp>
-        <p:nvSpPr>
-          <p:cNvPr id="2" name="Slide Image Placeholder 1"/>
-          <p:cNvSpPr>
-            <a:spLocks noGrp="1" noRot="1" noChangeAspect="1"/>
-          </p:cNvSpPr>
-          <p:nvPr>
-            <p:ph type="sldImg"/>
-          </p:nvPr>
-        </p:nvSpPr>
-        <p:spPr/>
-      </p:sp>
-      <p:sp>
-        <p:nvSpPr>
-          <p:cNvPr id="3" name="Notes Placeholder 2"/>
-          <p:cNvSpPr>
-            <a:spLocks noGrp="1"/>
-          </p:cNvSpPr>
-          <p:nvPr>
-            <p:ph type="body" idx="1"/>
-          </p:nvPr>
-        </p:nvSpPr>
-        <p:spPr/>
-        <p:txBody>
-          <a:bodyPr/>
-          <a:lstStyle/>
-          <a:p>
-            <a:endParaRPr lang="en-US" dirty="0"/>
-          </a:p>
-        </p:txBody>
-      </p:sp>
-      <p:sp>
-        <p:nvSpPr>
-          <p:cNvPr id="4" name="Slide Number Placeholder 3"/>
-          <p:cNvSpPr>
-            <a:spLocks noGrp="1"/>
-          </p:cNvSpPr>
-          <p:nvPr>
-            <p:ph type="sldNum" sz="quarter" idx="5"/>
-          </p:nvPr>
-        </p:nvSpPr>
-        <p:spPr/>
-        <p:txBody>
-          <a:bodyPr/>
-          <a:lstStyle/>
-          <a:p>
-            <a:fld id="{D5939589-3E79-4C82-AA4A-FE78234FAA59}" type="slidenum">
-              <a:rPr lang="en-US" smtClean="0"/>
-              <a:t>9</a:t>
-            </a:fld>
-            <a:endParaRPr lang="en-US" dirty="0"/>
-          </a:p>
-        </p:txBody>
-      </p:sp>
-    </p:spTree>
-    <p:extLst>
-      <p:ext uri="{BB962C8B-B14F-4D97-AF65-F5344CB8AC3E}">
-        <p14:creationId xmlns:p14="http://schemas.microsoft.com/office/powerpoint/2010/main" val="2159706391"/>
       </p:ext>
     </p:extLst>
   </p:cSld>
@@ -12299,10 +12409,43 @@
       </p:grpSpPr>
       <p:sp>
         <p:nvSpPr>
+          <p:cNvPr id="6" name="Content Placeholder 5">
+            <a:extLst>
+              <a:ext uri="{FF2B5EF4-FFF2-40B4-BE49-F238E27FC236}">
+                <a16:creationId xmlns:a16="http://schemas.microsoft.com/office/drawing/2014/main" id="{62FF1654-306D-262A-D360-5E5C2E6B39E3}"/>
+              </a:ext>
+            </a:extLst>
+          </p:cNvPr>
+          <p:cNvSpPr>
+            <a:spLocks noGrp="1"/>
+          </p:cNvSpPr>
+          <p:nvPr>
+            <p:ph sz="quarter" idx="4"/>
+          </p:nvPr>
+        </p:nvSpPr>
+        <p:spPr>
+          <a:xfrm>
+            <a:off x="4746929" y="4842344"/>
+            <a:ext cx="1979874" cy="494665"/>
+          </a:xfrm>
+        </p:spPr>
+        <p:txBody>
+          <a:bodyPr/>
+          <a:lstStyle/>
+          <a:p>
+            <a:r>
+              <a:rPr lang="en-US" dirty="0"/>
+              <a:t> </a:t>
+            </a:r>
+          </a:p>
+        </p:txBody>
+      </p:sp>
+      <p:sp>
+        <p:nvSpPr>
           <p:cNvPr id="2" name="Title 1">
             <a:extLst>
               <a:ext uri="{FF2B5EF4-FFF2-40B4-BE49-F238E27FC236}">
-                <a16:creationId xmlns:a16="http://schemas.microsoft.com/office/drawing/2014/main" id="{D58E24D3-07BE-C483-3F42-95EEE83332F6}"/>
+                <a16:creationId xmlns:a16="http://schemas.microsoft.com/office/drawing/2014/main" id="{88B8FDAA-00CD-846E-A576-B59DFA73F988}"/>
               </a:ext>
             </a:extLst>
           </p:cNvPr>
@@ -12315,8 +12458,8 @@
         </p:nvSpPr>
         <p:spPr>
           <a:xfrm>
-            <a:off x="993280" y="691763"/>
-            <a:ext cx="8707312" cy="811033"/>
+            <a:off x="1168842" y="489985"/>
+            <a:ext cx="3267986" cy="647052"/>
           </a:xfrm>
         </p:spPr>
         <p:txBody>
@@ -12324,26 +12467,18 @@
           <a:lstStyle/>
           <a:p>
             <a:r>
-              <a:rPr lang="en-US" dirty="0">
-                <a:solidFill>
-                  <a:schemeClr val="tx1"/>
-                </a:solidFill>
-              </a:rPr>
-              <a:t>Conclusions &amp; Fut</a:t>
-            </a:r>
-            <a:r>
               <a:rPr lang="en-US" dirty="0"/>
-              <a:t>ure scope</a:t>
+              <a:t>Results</a:t>
             </a:r>
           </a:p>
         </p:txBody>
       </p:sp>
       <p:sp>
         <p:nvSpPr>
-          <p:cNvPr id="63" name="Text Placeholder 62">
+          <p:cNvPr id="4" name="Content Placeholder 3">
             <a:extLst>
               <a:ext uri="{FF2B5EF4-FFF2-40B4-BE49-F238E27FC236}">
-                <a16:creationId xmlns:a16="http://schemas.microsoft.com/office/drawing/2014/main" id="{9EFE5C42-059F-482E-C029-E8FA5107EEDA}"/>
+                <a16:creationId xmlns:a16="http://schemas.microsoft.com/office/drawing/2014/main" id="{352B3B4A-6ED2-64D9-BEC7-1B6C66971286}"/>
               </a:ext>
             </a:extLst>
           </p:cNvPr>
@@ -12351,235 +12486,140 @@
             <a:spLocks noGrp="1"/>
           </p:cNvSpPr>
           <p:nvPr>
-            <p:ph sz="quarter" idx="15"/>
+            <p:ph sz="half" idx="2"/>
           </p:nvPr>
         </p:nvSpPr>
         <p:spPr>
           <a:xfrm>
-            <a:off x="1184111" y="2058311"/>
-            <a:ext cx="4663440" cy="1895475"/>
-          </a:xfrm>
-        </p:spPr>
-        <p:txBody>
-          <a:bodyPr>
-            <a:normAutofit/>
-          </a:bodyPr>
-          <a:lstStyle/>
-          <a:p>
-            <a:pPr marL="0" indent="0">
-              <a:buNone/>
-            </a:pPr>
-            <a:r>
-              <a:rPr lang="en-US" dirty="0"/>
-              <a:t>  </a:t>
-            </a:r>
-          </a:p>
-        </p:txBody>
-      </p:sp>
-      <p:sp>
-        <p:nvSpPr>
-          <p:cNvPr id="18" name="Content Placeholder 17">
-            <a:extLst>
-              <a:ext uri="{FF2B5EF4-FFF2-40B4-BE49-F238E27FC236}">
-                <a16:creationId xmlns:a16="http://schemas.microsoft.com/office/drawing/2014/main" id="{828FD192-492A-A40D-E86A-BABC77587C80}"/>
-              </a:ext>
-            </a:extLst>
-          </p:cNvPr>
-          <p:cNvSpPr>
-            <a:spLocks noGrp="1"/>
-          </p:cNvSpPr>
-          <p:nvPr>
-            <p:ph sz="quarter" idx="13"/>
-          </p:nvPr>
-        </p:nvSpPr>
-        <p:spPr/>
-        <p:txBody>
-          <a:bodyPr/>
-          <a:lstStyle/>
-          <a:p>
-            <a:r>
-              <a:rPr lang="en-US" dirty="0"/>
-              <a:t> </a:t>
-            </a:r>
-          </a:p>
-        </p:txBody>
-      </p:sp>
-      <p:sp>
-        <p:nvSpPr>
-          <p:cNvPr id="11" name="Content Placeholder 10">
-            <a:extLst>
-              <a:ext uri="{FF2B5EF4-FFF2-40B4-BE49-F238E27FC236}">
-                <a16:creationId xmlns:a16="http://schemas.microsoft.com/office/drawing/2014/main" id="{762FCA4D-7EEE-9E3D-F691-FEFB5FB337E6}"/>
-              </a:ext>
-            </a:extLst>
-          </p:cNvPr>
-          <p:cNvSpPr>
-            <a:spLocks noGrp="1"/>
-          </p:cNvSpPr>
-          <p:nvPr>
-            <p:ph sz="quarter" idx="4"/>
-          </p:nvPr>
-        </p:nvSpPr>
-        <p:spPr>
-          <a:xfrm>
-            <a:off x="937621" y="2058311"/>
-            <a:ext cx="9263902" cy="4628812"/>
+            <a:off x="1121134" y="1580018"/>
+            <a:ext cx="9716494" cy="4916198"/>
           </a:xfrm>
         </p:spPr>
         <p:txBody>
           <a:bodyPr/>
           <a:lstStyle/>
           <a:p>
-            <a:pPr marR="0" lvl="0" algn="just" defTabSz="914400" rtl="0" eaLnBrk="1" fontAlgn="auto" latinLnBrk="0" hangingPunct="1">
-              <a:lnSpc>
-                <a:spcPct val="150000"/>
-              </a:lnSpc>
-              <a:spcBef>
-                <a:spcPct val="0"/>
-              </a:spcBef>
-              <a:spcAft>
-                <a:spcPts val="0"/>
-              </a:spcAft>
-              <a:buClrTx/>
-              <a:buSzTx/>
+            <a:r>
+              <a:rPr lang="en-US" sz="2000" b="1" dirty="0"/>
+              <a:t>Output of Modules :</a:t>
+            </a:r>
+          </a:p>
+          <a:p>
+            <a:pPr marL="285750" indent="-285750">
               <a:buFont typeface="Wingdings" panose="05000000000000000000" pitchFamily="2" charset="2"/>
               <a:buChar char="Ø"/>
-              <a:tabLst/>
-              <a:defRPr/>
             </a:pPr>
             <a:r>
-              <a:rPr lang="en-US" b="1" dirty="0"/>
-              <a:t>Expansion</a:t>
-            </a:r>
-            <a:r>
-              <a:rPr lang="en-US" sz="1800" b="1" dirty="0"/>
-              <a:t> to </a:t>
-            </a:r>
-            <a:r>
-              <a:rPr lang="en-US" b="1" dirty="0"/>
-              <a:t>Group Discussion </a:t>
-            </a:r>
-            <a:r>
               <a:rPr lang="en-US" dirty="0"/>
-              <a:t>: </a:t>
-            </a:r>
-            <a:r>
-              <a:rPr lang="en-US" sz="1800" dirty="0"/>
-              <a:t>By combining technology with engaging strategies, it provides a unique and comprehensive self-improvement experience.</a:t>
-            </a:r>
-          </a:p>
-          <a:p>
-            <a:pPr marL="0" marR="0" lvl="0" indent="0" algn="just" defTabSz="914400" rtl="0" eaLnBrk="1" fontAlgn="auto" latinLnBrk="0" hangingPunct="1">
-              <a:lnSpc>
-                <a:spcPct val="150000"/>
-              </a:lnSpc>
-              <a:spcBef>
-                <a:spcPct val="0"/>
-              </a:spcBef>
-              <a:spcAft>
-                <a:spcPts val="0"/>
-              </a:spcAft>
-              <a:buClrTx/>
-              <a:buSzTx/>
-              <a:buNone/>
-              <a:tabLst/>
-              <a:defRPr/>
-            </a:pPr>
-            <a:endParaRPr lang="en-US" sz="1800" dirty="0"/>
-          </a:p>
-          <a:p>
-            <a:pPr marR="0" lvl="0" algn="just" defTabSz="914400" rtl="0" eaLnBrk="1" fontAlgn="auto" latinLnBrk="0" hangingPunct="1">
-              <a:lnSpc>
-                <a:spcPct val="150000"/>
-              </a:lnSpc>
-              <a:spcBef>
-                <a:spcPct val="0"/>
-              </a:spcBef>
-              <a:spcAft>
-                <a:spcPts val="0"/>
-              </a:spcAft>
-              <a:buClrTx/>
-              <a:buSzTx/>
+              <a:t>User is able to Onboard and Register Himself.</a:t>
+            </a:r>
+          </a:p>
+          <a:p>
+            <a:pPr marL="285750" indent="-285750">
               <a:buFont typeface="Wingdings" panose="05000000000000000000" pitchFamily="2" charset="2"/>
               <a:buChar char="Ø"/>
-              <a:tabLst/>
-              <a:defRPr/>
             </a:pPr>
             <a:r>
-              <a:rPr lang="en-US" sz="1800" b="1" dirty="0"/>
-              <a:t>Voice Recognition for Real-Time Feedback : </a:t>
-            </a:r>
-            <a:r>
-              <a:rPr lang="en-US" sz="1800" dirty="0"/>
-              <a:t>Integrating voice analysis to assess speech and provide immediate feedback.</a:t>
-            </a:r>
-          </a:p>
-          <a:p>
-            <a:pPr marL="0" marR="0" lvl="0" indent="0" algn="just" defTabSz="914400" rtl="0" eaLnBrk="1" fontAlgn="auto" latinLnBrk="0" hangingPunct="1">
-              <a:lnSpc>
-                <a:spcPct val="150000"/>
-              </a:lnSpc>
-              <a:spcBef>
-                <a:spcPct val="0"/>
-              </a:spcBef>
-              <a:spcAft>
-                <a:spcPts val="0"/>
-              </a:spcAft>
-              <a:buClrTx/>
-              <a:buSzTx/>
-              <a:buNone/>
-              <a:tabLst/>
-              <a:defRPr/>
-            </a:pPr>
-            <a:endParaRPr lang="en-US" sz="1800" dirty="0"/>
-          </a:p>
-          <a:p>
-            <a:pPr marR="0" lvl="0" algn="just" defTabSz="914400" rtl="0" eaLnBrk="1" fontAlgn="auto" latinLnBrk="0" hangingPunct="1">
-              <a:lnSpc>
-                <a:spcPct val="150000"/>
-              </a:lnSpc>
-              <a:spcBef>
-                <a:spcPct val="0"/>
-              </a:spcBef>
-              <a:spcAft>
-                <a:spcPts val="0"/>
-              </a:spcAft>
-              <a:buClrTx/>
-              <a:buSzTx/>
+              <a:rPr lang="en-US" dirty="0"/>
+              <a:t>User is able to Login and Give its Assessment by itself.</a:t>
+            </a:r>
+          </a:p>
+          <a:p>
+            <a:pPr marL="285750" indent="-285750">
               <a:buFont typeface="Wingdings" panose="05000000000000000000" pitchFamily="2" charset="2"/>
               <a:buChar char="Ø"/>
-              <a:tabLst/>
-              <a:defRPr/>
             </a:pPr>
             <a:r>
-              <a:rPr lang="en-US" sz="1800" b="1" dirty="0"/>
-              <a:t>Customizable Learning Paths : </a:t>
-            </a:r>
-            <a:r>
-              <a:rPr lang="en-US" sz="1800" dirty="0"/>
-              <a:t>Users can choose specific areas to focus on based on their career and personal goals.</a:t>
-            </a:r>
-          </a:p>
-          <a:p>
-            <a:pPr marL="0" marR="0" lvl="0" indent="0" algn="just" defTabSz="914400" rtl="0" eaLnBrk="1" fontAlgn="auto" latinLnBrk="0" hangingPunct="1">
-              <a:lnSpc>
-                <a:spcPct val="150000"/>
-              </a:lnSpc>
-              <a:spcBef>
-                <a:spcPct val="0"/>
-              </a:spcBef>
-              <a:spcAft>
-                <a:spcPts val="0"/>
-              </a:spcAft>
-              <a:buClrTx/>
-              <a:buSzTx/>
-              <a:buNone/>
-              <a:tabLst/>
-              <a:defRPr/>
+              <a:rPr lang="en-US" dirty="0"/>
+              <a:t>Our App is able to Assess a user dynamically based on their responses.</a:t>
+            </a:r>
+          </a:p>
+          <a:p>
+            <a:pPr marL="285750" indent="-285750">
+              <a:buFont typeface="Wingdings" panose="05000000000000000000" pitchFamily="2" charset="2"/>
+              <a:buChar char="Ø"/>
             </a:pPr>
-            <a:endParaRPr lang="en-US" sz="1800" dirty="0"/>
-          </a:p>
-          <a:p>
+            <a:r>
+              <a:rPr lang="en-US" dirty="0"/>
+              <a:t>A Complete Dashboard for overall and distinct results is there.</a:t>
+            </a:r>
+          </a:p>
+          <a:p>
+            <a:pPr marL="285750" indent="-285750">
+              <a:buFont typeface="Wingdings" panose="05000000000000000000" pitchFamily="2" charset="2"/>
+              <a:buChar char="Ø"/>
+            </a:pPr>
+            <a:r>
+              <a:rPr lang="en-US" dirty="0"/>
+              <a:t>User are able to share their POVs over the community Forum via Small Blogs.</a:t>
+            </a:r>
+          </a:p>
+          <a:p>
+            <a:pPr marL="285750" indent="-285750">
+              <a:buFont typeface="Wingdings" panose="05000000000000000000" pitchFamily="2" charset="2"/>
+              <a:buChar char="Ø"/>
+            </a:pPr>
+            <a:r>
+              <a:rPr lang="en-US" dirty="0"/>
+              <a:t>User is able to handle their profile &amp; able to Logout.</a:t>
+            </a:r>
+          </a:p>
+          <a:p>
+            <a:pPr marL="285750" indent="-285750">
+              <a:buFont typeface="Wingdings" panose="05000000000000000000" pitchFamily="2" charset="2"/>
+              <a:buChar char="Ø"/>
+            </a:pPr>
+            <a:endParaRPr lang="en-US" dirty="0"/>
+          </a:p>
+          <a:p>
+            <a:r>
+              <a:rPr lang="en-US" sz="2000" b="1" dirty="0"/>
+              <a:t>Intermediate Results :</a:t>
+            </a:r>
+          </a:p>
+          <a:p>
+            <a:pPr marL="285750" indent="-285750">
+              <a:buFont typeface="Wingdings" panose="05000000000000000000" pitchFamily="2" charset="2"/>
+              <a:buChar char="Ø"/>
+            </a:pPr>
+            <a:r>
+              <a:rPr lang="en-US" dirty="0"/>
+              <a:t>Successfully able to implement API to generate tasks from DB over thousands of task according to the level of user assessment.</a:t>
+            </a:r>
+          </a:p>
+          <a:p>
+            <a:pPr marL="285750" indent="-285750">
+              <a:buFont typeface="Wingdings" panose="05000000000000000000" pitchFamily="2" charset="2"/>
+              <a:buChar char="Ø"/>
+            </a:pPr>
+            <a:r>
+              <a:rPr lang="en-US" dirty="0"/>
+              <a:t>The Feedback Form is complete from UI </a:t>
+            </a:r>
+            <a:r>
+              <a:rPr lang="en-US" dirty="0" err="1"/>
+              <a:t>persective</a:t>
+            </a:r>
+            <a:r>
+              <a:rPr lang="en-US" dirty="0"/>
+              <a:t>.</a:t>
+            </a:r>
+          </a:p>
+          <a:p>
+            <a:pPr marL="285750" indent="-285750">
+              <a:buFont typeface="Wingdings" panose="05000000000000000000" pitchFamily="2" charset="2"/>
+              <a:buChar char="Ø"/>
+            </a:pPr>
+            <a:r>
+              <a:rPr lang="en-US" dirty="0"/>
+              <a:t>Research Paper is under Development. It is completed 60% - 70%.</a:t>
+            </a:r>
+          </a:p>
+          <a:p>
+            <a:pPr marL="285750" indent="-285750">
+              <a:buFont typeface="Wingdings" panose="05000000000000000000" pitchFamily="2" charset="2"/>
+              <a:buChar char="Ø"/>
+            </a:pPr>
             <a:endParaRPr lang="en-US" dirty="0"/>
           </a:p>
         </p:txBody>
@@ -12587,7 +12627,7 @@
     </p:spTree>
     <p:extLst>
       <p:ext uri="{BB962C8B-B14F-4D97-AF65-F5344CB8AC3E}">
-        <p14:creationId xmlns:p14="http://schemas.microsoft.com/office/powerpoint/2010/main" val="719664809"/>
+        <p14:creationId xmlns:p14="http://schemas.microsoft.com/office/powerpoint/2010/main" val="2102816447"/>
       </p:ext>
     </p:extLst>
   </p:cSld>
@@ -12616,6 +12656,323 @@
       </p:grpSpPr>
       <p:sp>
         <p:nvSpPr>
+          <p:cNvPr id="2" name="Title 1">
+            <a:extLst>
+              <a:ext uri="{FF2B5EF4-FFF2-40B4-BE49-F238E27FC236}">
+                <a16:creationId xmlns:a16="http://schemas.microsoft.com/office/drawing/2014/main" id="{D58E24D3-07BE-C483-3F42-95EEE83332F6}"/>
+              </a:ext>
+            </a:extLst>
+          </p:cNvPr>
+          <p:cNvSpPr>
+            <a:spLocks noGrp="1"/>
+          </p:cNvSpPr>
+          <p:nvPr>
+            <p:ph type="title"/>
+          </p:nvPr>
+        </p:nvSpPr>
+        <p:spPr>
+          <a:xfrm>
+            <a:off x="993280" y="691763"/>
+            <a:ext cx="8707312" cy="811033"/>
+          </a:xfrm>
+        </p:spPr>
+        <p:txBody>
+          <a:bodyPr/>
+          <a:lstStyle/>
+          <a:p>
+            <a:r>
+              <a:rPr lang="en-US" dirty="0">
+                <a:solidFill>
+                  <a:schemeClr val="tx1"/>
+                </a:solidFill>
+              </a:rPr>
+              <a:t>Conclusions &amp; Fut</a:t>
+            </a:r>
+            <a:r>
+              <a:rPr lang="en-US" dirty="0"/>
+              <a:t>ure scope</a:t>
+            </a:r>
+          </a:p>
+        </p:txBody>
+      </p:sp>
+      <p:sp>
+        <p:nvSpPr>
+          <p:cNvPr id="63" name="Text Placeholder 62">
+            <a:extLst>
+              <a:ext uri="{FF2B5EF4-FFF2-40B4-BE49-F238E27FC236}">
+                <a16:creationId xmlns:a16="http://schemas.microsoft.com/office/drawing/2014/main" id="{9EFE5C42-059F-482E-C029-E8FA5107EEDA}"/>
+              </a:ext>
+            </a:extLst>
+          </p:cNvPr>
+          <p:cNvSpPr>
+            <a:spLocks noGrp="1"/>
+          </p:cNvSpPr>
+          <p:nvPr>
+            <p:ph sz="quarter" idx="15"/>
+          </p:nvPr>
+        </p:nvSpPr>
+        <p:spPr>
+          <a:xfrm>
+            <a:off x="1184111" y="2058311"/>
+            <a:ext cx="4663440" cy="1895475"/>
+          </a:xfrm>
+        </p:spPr>
+        <p:txBody>
+          <a:bodyPr>
+            <a:normAutofit/>
+          </a:bodyPr>
+          <a:lstStyle/>
+          <a:p>
+            <a:pPr marL="0" indent="0">
+              <a:buNone/>
+            </a:pPr>
+            <a:r>
+              <a:rPr lang="en-US" dirty="0"/>
+              <a:t>  </a:t>
+            </a:r>
+          </a:p>
+        </p:txBody>
+      </p:sp>
+      <p:sp>
+        <p:nvSpPr>
+          <p:cNvPr id="18" name="Content Placeholder 17">
+            <a:extLst>
+              <a:ext uri="{FF2B5EF4-FFF2-40B4-BE49-F238E27FC236}">
+                <a16:creationId xmlns:a16="http://schemas.microsoft.com/office/drawing/2014/main" id="{828FD192-492A-A40D-E86A-BABC77587C80}"/>
+              </a:ext>
+            </a:extLst>
+          </p:cNvPr>
+          <p:cNvSpPr>
+            <a:spLocks noGrp="1"/>
+          </p:cNvSpPr>
+          <p:nvPr>
+            <p:ph sz="quarter" idx="13"/>
+          </p:nvPr>
+        </p:nvSpPr>
+        <p:spPr/>
+        <p:txBody>
+          <a:bodyPr/>
+          <a:lstStyle/>
+          <a:p>
+            <a:r>
+              <a:rPr lang="en-US" dirty="0"/>
+              <a:t> </a:t>
+            </a:r>
+          </a:p>
+        </p:txBody>
+      </p:sp>
+      <p:sp>
+        <p:nvSpPr>
+          <p:cNvPr id="11" name="Content Placeholder 10">
+            <a:extLst>
+              <a:ext uri="{FF2B5EF4-FFF2-40B4-BE49-F238E27FC236}">
+                <a16:creationId xmlns:a16="http://schemas.microsoft.com/office/drawing/2014/main" id="{762FCA4D-7EEE-9E3D-F691-FEFB5FB337E6}"/>
+              </a:ext>
+            </a:extLst>
+          </p:cNvPr>
+          <p:cNvSpPr>
+            <a:spLocks noGrp="1"/>
+          </p:cNvSpPr>
+          <p:nvPr>
+            <p:ph sz="quarter" idx="4"/>
+          </p:nvPr>
+        </p:nvSpPr>
+        <p:spPr>
+          <a:xfrm>
+            <a:off x="937621" y="2058311"/>
+            <a:ext cx="9263902" cy="4628812"/>
+          </a:xfrm>
+        </p:spPr>
+        <p:txBody>
+          <a:bodyPr/>
+          <a:lstStyle/>
+          <a:p>
+            <a:pPr marR="0" lvl="0" algn="just" defTabSz="914400" rtl="0" eaLnBrk="1" fontAlgn="auto" latinLnBrk="0" hangingPunct="1">
+              <a:lnSpc>
+                <a:spcPct val="150000"/>
+              </a:lnSpc>
+              <a:spcBef>
+                <a:spcPct val="0"/>
+              </a:spcBef>
+              <a:spcAft>
+                <a:spcPts val="0"/>
+              </a:spcAft>
+              <a:buClrTx/>
+              <a:buSzTx/>
+              <a:buFont typeface="Wingdings" panose="05000000000000000000" pitchFamily="2" charset="2"/>
+              <a:buChar char="Ø"/>
+              <a:tabLst/>
+              <a:defRPr/>
+            </a:pPr>
+            <a:r>
+              <a:rPr lang="en-US" b="1" dirty="0"/>
+              <a:t>Expansion</a:t>
+            </a:r>
+            <a:r>
+              <a:rPr lang="en-US" sz="1800" b="1" dirty="0"/>
+              <a:t> to </a:t>
+            </a:r>
+            <a:r>
+              <a:rPr lang="en-US" b="1" dirty="0"/>
+              <a:t>Group Discussion </a:t>
+            </a:r>
+            <a:r>
+              <a:rPr lang="en-US" dirty="0"/>
+              <a:t>: </a:t>
+            </a:r>
+            <a:r>
+              <a:rPr lang="en-US" sz="1800" dirty="0"/>
+              <a:t>By combining technology with engaging strategies, it provides a unique and comprehensive self-improvement experience.</a:t>
+            </a:r>
+          </a:p>
+          <a:p>
+            <a:pPr marL="0" marR="0" lvl="0" indent="0" algn="just" defTabSz="914400" rtl="0" eaLnBrk="1" fontAlgn="auto" latinLnBrk="0" hangingPunct="1">
+              <a:lnSpc>
+                <a:spcPct val="150000"/>
+              </a:lnSpc>
+              <a:spcBef>
+                <a:spcPct val="0"/>
+              </a:spcBef>
+              <a:spcAft>
+                <a:spcPts val="0"/>
+              </a:spcAft>
+              <a:buClrTx/>
+              <a:buSzTx/>
+              <a:buNone/>
+              <a:tabLst/>
+              <a:defRPr/>
+            </a:pPr>
+            <a:endParaRPr lang="en-US" sz="1800" dirty="0"/>
+          </a:p>
+          <a:p>
+            <a:pPr marR="0" lvl="0" algn="just" defTabSz="914400" rtl="0" eaLnBrk="1" fontAlgn="auto" latinLnBrk="0" hangingPunct="1">
+              <a:lnSpc>
+                <a:spcPct val="150000"/>
+              </a:lnSpc>
+              <a:spcBef>
+                <a:spcPct val="0"/>
+              </a:spcBef>
+              <a:spcAft>
+                <a:spcPts val="0"/>
+              </a:spcAft>
+              <a:buClrTx/>
+              <a:buSzTx/>
+              <a:buFont typeface="Wingdings" panose="05000000000000000000" pitchFamily="2" charset="2"/>
+              <a:buChar char="Ø"/>
+              <a:tabLst/>
+              <a:defRPr/>
+            </a:pPr>
+            <a:r>
+              <a:rPr lang="en-US" sz="1800" b="1" dirty="0"/>
+              <a:t>Voice Recognition for Real-Time Feedback : </a:t>
+            </a:r>
+            <a:r>
+              <a:rPr lang="en-US" sz="1800" dirty="0"/>
+              <a:t>Integrating voice analysis to assess speech and provide immediate feedback.</a:t>
+            </a:r>
+          </a:p>
+          <a:p>
+            <a:pPr marL="0" marR="0" lvl="0" indent="0" algn="just" defTabSz="914400" rtl="0" eaLnBrk="1" fontAlgn="auto" latinLnBrk="0" hangingPunct="1">
+              <a:lnSpc>
+                <a:spcPct val="150000"/>
+              </a:lnSpc>
+              <a:spcBef>
+                <a:spcPct val="0"/>
+              </a:spcBef>
+              <a:spcAft>
+                <a:spcPts val="0"/>
+              </a:spcAft>
+              <a:buClrTx/>
+              <a:buSzTx/>
+              <a:buNone/>
+              <a:tabLst/>
+              <a:defRPr/>
+            </a:pPr>
+            <a:endParaRPr lang="en-US" sz="1800" dirty="0"/>
+          </a:p>
+          <a:p>
+            <a:pPr marR="0" lvl="0" algn="just" defTabSz="914400" rtl="0" eaLnBrk="1" fontAlgn="auto" latinLnBrk="0" hangingPunct="1">
+              <a:lnSpc>
+                <a:spcPct val="150000"/>
+              </a:lnSpc>
+              <a:spcBef>
+                <a:spcPct val="0"/>
+              </a:spcBef>
+              <a:spcAft>
+                <a:spcPts val="0"/>
+              </a:spcAft>
+              <a:buClrTx/>
+              <a:buSzTx/>
+              <a:buFont typeface="Wingdings" panose="05000000000000000000" pitchFamily="2" charset="2"/>
+              <a:buChar char="Ø"/>
+              <a:tabLst/>
+              <a:defRPr/>
+            </a:pPr>
+            <a:r>
+              <a:rPr lang="en-US" sz="1800" b="1" dirty="0"/>
+              <a:t>Customizable Learning Paths : </a:t>
+            </a:r>
+            <a:r>
+              <a:rPr lang="en-US" sz="1800" dirty="0"/>
+              <a:t>Users can choose specific areas to focus on based on their career and personal goals.</a:t>
+            </a:r>
+          </a:p>
+          <a:p>
+            <a:pPr marL="0" marR="0" lvl="0" indent="0" algn="just" defTabSz="914400" rtl="0" eaLnBrk="1" fontAlgn="auto" latinLnBrk="0" hangingPunct="1">
+              <a:lnSpc>
+                <a:spcPct val="150000"/>
+              </a:lnSpc>
+              <a:spcBef>
+                <a:spcPct val="0"/>
+              </a:spcBef>
+              <a:spcAft>
+                <a:spcPts val="0"/>
+              </a:spcAft>
+              <a:buClrTx/>
+              <a:buSzTx/>
+              <a:buNone/>
+              <a:tabLst/>
+              <a:defRPr/>
+            </a:pPr>
+            <a:endParaRPr lang="en-US" sz="1800" dirty="0"/>
+          </a:p>
+          <a:p>
+            <a:endParaRPr lang="en-US" dirty="0"/>
+          </a:p>
+        </p:txBody>
+      </p:sp>
+    </p:spTree>
+    <p:extLst>
+      <p:ext uri="{BB962C8B-B14F-4D97-AF65-F5344CB8AC3E}">
+        <p14:creationId xmlns:p14="http://schemas.microsoft.com/office/powerpoint/2010/main" val="719664809"/>
+      </p:ext>
+    </p:extLst>
+  </p:cSld>
+  <p:clrMapOvr>
+    <a:masterClrMapping/>
+  </p:clrMapOvr>
+</p:sld>
+</file>
+
+<file path=ppt/slides/slide12.xml><?xml version="1.0" encoding="utf-8"?>
+<p:sld xmlns:a="http://schemas.openxmlformats.org/drawingml/2006/main" xmlns:r="http://schemas.openxmlformats.org/officeDocument/2006/relationships" xmlns:p="http://schemas.openxmlformats.org/presentationml/2006/main">
+  <p:cSld>
+    <p:spTree>
+      <p:nvGrpSpPr>
+        <p:cNvPr id="1" name=""/>
+        <p:cNvGrpSpPr/>
+        <p:nvPr/>
+      </p:nvGrpSpPr>
+      <p:grpSpPr>
+        <a:xfrm>
+          <a:off x="0" y="0"/>
+          <a:ext cx="0" cy="0"/>
+          <a:chOff x="0" y="0"/>
+          <a:chExt cx="0" cy="0"/>
+        </a:xfrm>
+      </p:grpSpPr>
+      <p:sp>
+        <p:nvSpPr>
           <p:cNvPr id="3" name="Title 2">
             <a:extLst>
               <a:ext uri="{FF2B5EF4-FFF2-40B4-BE49-F238E27FC236}">
@@ -12917,7 +13274,7 @@
 </p:sld>
 </file>
 
-<file path=ppt/slides/slide12.xml><?xml version="1.0" encoding="utf-8"?>
+<file path=ppt/slides/slide13.xml><?xml version="1.0" encoding="utf-8"?>
 <p:sld xmlns:a="http://schemas.openxmlformats.org/drawingml/2006/main" xmlns:r="http://schemas.openxmlformats.org/officeDocument/2006/relationships" xmlns:p="http://schemas.openxmlformats.org/presentationml/2006/main">
   <p:cSld>
     <p:spTree>
@@ -14646,7 +15003,7 @@
         <p:cNvPr id="1" name="">
           <a:extLst>
             <a:ext uri="{FF2B5EF4-FFF2-40B4-BE49-F238E27FC236}">
-              <a16:creationId xmlns:a16="http://schemas.microsoft.com/office/drawing/2014/main" id="{D64C4BAD-4C2C-99B6-ED68-3B233D6DA588}"/>
+              <a16:creationId xmlns:a16="http://schemas.microsoft.com/office/drawing/2014/main" id="{874E100A-99F1-E984-C391-E626575E3BD0}"/>
             </a:ext>
           </a:extLst>
         </p:cNvPr>
@@ -14666,7 +15023,7 @@
           <p:cNvPr id="4" name="Title 3">
             <a:extLst>
               <a:ext uri="{FF2B5EF4-FFF2-40B4-BE49-F238E27FC236}">
-                <a16:creationId xmlns:a16="http://schemas.microsoft.com/office/drawing/2014/main" id="{3F30BD8D-E843-63A1-992D-D117836BA6BF}"/>
+                <a16:creationId xmlns:a16="http://schemas.microsoft.com/office/drawing/2014/main" id="{28F04BB9-B301-7EEC-A1BB-BA627AD6B1A3}"/>
               </a:ext>
             </a:extLst>
           </p:cNvPr>
@@ -14699,7 +15056,7 @@
           <p:cNvPr id="7" name="Subtitle 6">
             <a:extLst>
               <a:ext uri="{FF2B5EF4-FFF2-40B4-BE49-F238E27FC236}">
-                <a16:creationId xmlns:a16="http://schemas.microsoft.com/office/drawing/2014/main" id="{1053B384-1B64-0097-7D7D-0A64D8733D58}"/>
+                <a16:creationId xmlns:a16="http://schemas.microsoft.com/office/drawing/2014/main" id="{05D34143-76A4-D7F6-ADE1-ED872DC99745}"/>
               </a:ext>
             </a:extLst>
           </p:cNvPr>
@@ -14724,7 +15081,7 @@
           <a:p>
             <a:r>
               <a:rPr lang="en-US" dirty="0"/>
-              <a:t>   Community Page       |       Edit Profile        |    Feedback Form</a:t>
+              <a:t>|         Task Generation Page &amp; Mark Complete Page</a:t>
             </a:r>
           </a:p>
         </p:txBody>
@@ -14734,7 +15091,7 @@
           <p:cNvPr id="10" name="Subtitle 6">
             <a:extLst>
               <a:ext uri="{FF2B5EF4-FFF2-40B4-BE49-F238E27FC236}">
-                <a16:creationId xmlns:a16="http://schemas.microsoft.com/office/drawing/2014/main" id="{4C137C7B-B2E9-5DDE-370C-0FBF46F3BAA1}"/>
+                <a16:creationId xmlns:a16="http://schemas.microsoft.com/office/drawing/2014/main" id="{CCA10D89-2BF7-9F17-9D25-4678B56FBB11}"/>
               </a:ext>
             </a:extLst>
           </p:cNvPr>
@@ -14931,6 +15288,347 @@
                   <a:schemeClr val="tx1"/>
                 </a:solidFill>
               </a:rPr>
+              <a:t>Task Generation Module – Generate a New Task &amp; Mark it Complete</a:t>
+            </a:r>
+          </a:p>
+        </p:txBody>
+      </p:sp>
+      <p:pic>
+        <p:nvPicPr>
+          <p:cNvPr id="5" name="Picture 4">
+            <a:extLst>
+              <a:ext uri="{FF2B5EF4-FFF2-40B4-BE49-F238E27FC236}">
+                <a16:creationId xmlns:a16="http://schemas.microsoft.com/office/drawing/2014/main" id="{343D79C1-63D2-3C77-3B66-1A6390F6F905}"/>
+              </a:ext>
+            </a:extLst>
+          </p:cNvPr>
+          <p:cNvPicPr>
+            <a:picLocks noChangeAspect="1"/>
+          </p:cNvPicPr>
+          <p:nvPr/>
+        </p:nvPicPr>
+        <p:blipFill>
+          <a:blip r:embed="rId3"/>
+          <a:stretch>
+            <a:fillRect/>
+          </a:stretch>
+        </p:blipFill>
+        <p:spPr>
+          <a:xfrm>
+            <a:off x="4382887" y="2417196"/>
+            <a:ext cx="1793396" cy="3923969"/>
+          </a:xfrm>
+          <a:prstGeom prst="rect">
+            <a:avLst/>
+          </a:prstGeom>
+        </p:spPr>
+      </p:pic>
+    </p:spTree>
+    <p:extLst>
+      <p:ext uri="{BB962C8B-B14F-4D97-AF65-F5344CB8AC3E}">
+        <p14:creationId xmlns:p14="http://schemas.microsoft.com/office/powerpoint/2010/main" val="3620950419"/>
+      </p:ext>
+    </p:extLst>
+  </p:cSld>
+  <p:clrMapOvr>
+    <a:masterClrMapping/>
+  </p:clrMapOvr>
+</p:sld>
+</file>
+
+<file path=ppt/slides/slide9.xml><?xml version="1.0" encoding="utf-8"?>
+<p:sld xmlns:a="http://schemas.openxmlformats.org/drawingml/2006/main" xmlns:r="http://schemas.openxmlformats.org/officeDocument/2006/relationships" xmlns:p="http://schemas.openxmlformats.org/presentationml/2006/main">
+  <p:cSld>
+    <p:spTree>
+      <p:nvGrpSpPr>
+        <p:cNvPr id="1" name="">
+          <a:extLst>
+            <a:ext uri="{FF2B5EF4-FFF2-40B4-BE49-F238E27FC236}">
+              <a16:creationId xmlns:a16="http://schemas.microsoft.com/office/drawing/2014/main" id="{D64C4BAD-4C2C-99B6-ED68-3B233D6DA588}"/>
+            </a:ext>
+          </a:extLst>
+        </p:cNvPr>
+        <p:cNvGrpSpPr/>
+        <p:nvPr/>
+      </p:nvGrpSpPr>
+      <p:grpSpPr>
+        <a:xfrm>
+          <a:off x="0" y="0"/>
+          <a:ext cx="0" cy="0"/>
+          <a:chOff x="0" y="0"/>
+          <a:chExt cx="0" cy="0"/>
+        </a:xfrm>
+      </p:grpSpPr>
+      <p:sp>
+        <p:nvSpPr>
+          <p:cNvPr id="4" name="Title 3">
+            <a:extLst>
+              <a:ext uri="{FF2B5EF4-FFF2-40B4-BE49-F238E27FC236}">
+                <a16:creationId xmlns:a16="http://schemas.microsoft.com/office/drawing/2014/main" id="{3F30BD8D-E843-63A1-992D-D117836BA6BF}"/>
+              </a:ext>
+            </a:extLst>
+          </p:cNvPr>
+          <p:cNvSpPr>
+            <a:spLocks noGrp="1"/>
+          </p:cNvSpPr>
+          <p:nvPr>
+            <p:ph type="ctrTitle"/>
+          </p:nvPr>
+        </p:nvSpPr>
+        <p:spPr>
+          <a:xfrm>
+            <a:off x="1407379" y="183594"/>
+            <a:ext cx="5836262" cy="878619"/>
+          </a:xfrm>
+        </p:spPr>
+        <p:txBody>
+          <a:bodyPr/>
+          <a:lstStyle/>
+          <a:p>
+            <a:r>
+              <a:rPr lang="en-US" sz="4000" dirty="0"/>
+              <a:t>IMPLEMENTATION</a:t>
+            </a:r>
+          </a:p>
+        </p:txBody>
+      </p:sp>
+      <p:sp>
+        <p:nvSpPr>
+          <p:cNvPr id="7" name="Subtitle 6">
+            <a:extLst>
+              <a:ext uri="{FF2B5EF4-FFF2-40B4-BE49-F238E27FC236}">
+                <a16:creationId xmlns:a16="http://schemas.microsoft.com/office/drawing/2014/main" id="{1053B384-1B64-0097-7D7D-0A64D8733D58}"/>
+              </a:ext>
+            </a:extLst>
+          </p:cNvPr>
+          <p:cNvSpPr>
+            <a:spLocks noGrp="1"/>
+          </p:cNvSpPr>
+          <p:nvPr>
+            <p:ph type="subTitle" idx="1"/>
+          </p:nvPr>
+        </p:nvSpPr>
+        <p:spPr>
+          <a:xfrm>
+            <a:off x="1407379" y="1610490"/>
+            <a:ext cx="10302237" cy="397191"/>
+          </a:xfrm>
+        </p:spPr>
+        <p:txBody>
+          <a:bodyPr>
+            <a:normAutofit/>
+          </a:bodyPr>
+          <a:lstStyle/>
+          <a:p>
+            <a:r>
+              <a:rPr lang="en-US" dirty="0"/>
+              <a:t>   Community Page       |       Edit Profile        |    Feedback Form</a:t>
+            </a:r>
+          </a:p>
+        </p:txBody>
+      </p:sp>
+      <p:sp>
+        <p:nvSpPr>
+          <p:cNvPr id="10" name="Subtitle 6">
+            <a:extLst>
+              <a:ext uri="{FF2B5EF4-FFF2-40B4-BE49-F238E27FC236}">
+                <a16:creationId xmlns:a16="http://schemas.microsoft.com/office/drawing/2014/main" id="{4C137C7B-B2E9-5DDE-370C-0FBF46F3BAA1}"/>
+              </a:ext>
+            </a:extLst>
+          </p:cNvPr>
+          <p:cNvSpPr txBox="1">
+            <a:spLocks/>
+          </p:cNvSpPr>
+          <p:nvPr/>
+        </p:nvSpPr>
+        <p:spPr>
+          <a:xfrm>
+            <a:off x="1407379" y="1137756"/>
+            <a:ext cx="10302237" cy="397191"/>
+          </a:xfrm>
+          <a:prstGeom prst="rect">
+            <a:avLst/>
+          </a:prstGeom>
+        </p:spPr>
+        <p:txBody>
+          <a:bodyPr vert="horz" lIns="0" tIns="0" rIns="0" bIns="0" rtlCol="0" anchor="b" anchorCtr="0">
+            <a:normAutofit/>
+          </a:bodyPr>
+          <a:lstStyle>
+            <a:lvl1pPr marL="0" indent="0" algn="l" defTabSz="914400" rtl="0" eaLnBrk="1" latinLnBrk="0" hangingPunct="1">
+              <a:lnSpc>
+                <a:spcPct val="90000"/>
+              </a:lnSpc>
+              <a:spcBef>
+                <a:spcPts val="1000"/>
+              </a:spcBef>
+              <a:buFont typeface="Arial" panose="020B0604020202020204" pitchFamily="34" charset="0"/>
+              <a:buNone/>
+              <a:defRPr sz="2400" kern="1200">
+                <a:solidFill>
+                  <a:schemeClr val="bg1"/>
+                </a:solidFill>
+                <a:latin typeface="+mn-lt"/>
+                <a:ea typeface="+mn-ea"/>
+                <a:cs typeface="+mn-cs"/>
+              </a:defRPr>
+            </a:lvl1pPr>
+            <a:lvl2pPr marL="457200" indent="0" algn="ctr" defTabSz="914400" rtl="0" eaLnBrk="1" latinLnBrk="0" hangingPunct="1">
+              <a:lnSpc>
+                <a:spcPct val="90000"/>
+              </a:lnSpc>
+              <a:spcBef>
+                <a:spcPts val="500"/>
+              </a:spcBef>
+              <a:buFont typeface="Arial" panose="020B0604020202020204" pitchFamily="34" charset="0"/>
+              <a:buNone/>
+              <a:defRPr sz="2000" kern="1200">
+                <a:solidFill>
+                  <a:schemeClr val="tx1"/>
+                </a:solidFill>
+                <a:latin typeface="+mn-lt"/>
+                <a:ea typeface="+mn-ea"/>
+                <a:cs typeface="+mn-cs"/>
+              </a:defRPr>
+            </a:lvl2pPr>
+            <a:lvl3pPr marL="914400" indent="0" algn="ctr" defTabSz="914400" rtl="0" eaLnBrk="1" latinLnBrk="0" hangingPunct="1">
+              <a:lnSpc>
+                <a:spcPct val="90000"/>
+              </a:lnSpc>
+              <a:spcBef>
+                <a:spcPts val="500"/>
+              </a:spcBef>
+              <a:buFont typeface="Arial" panose="020B0604020202020204" pitchFamily="34" charset="0"/>
+              <a:buNone/>
+              <a:defRPr sz="1800" kern="1200">
+                <a:solidFill>
+                  <a:schemeClr val="tx1"/>
+                </a:solidFill>
+                <a:latin typeface="+mn-lt"/>
+                <a:ea typeface="+mn-ea"/>
+                <a:cs typeface="+mn-cs"/>
+              </a:defRPr>
+            </a:lvl3pPr>
+            <a:lvl4pPr marL="1371600" indent="0" algn="ctr" defTabSz="914400" rtl="0" eaLnBrk="1" latinLnBrk="0" hangingPunct="1">
+              <a:lnSpc>
+                <a:spcPct val="90000"/>
+              </a:lnSpc>
+              <a:spcBef>
+                <a:spcPts val="500"/>
+              </a:spcBef>
+              <a:buFont typeface="Arial" panose="020B0604020202020204" pitchFamily="34" charset="0"/>
+              <a:buNone/>
+              <a:defRPr sz="1600" kern="1200">
+                <a:solidFill>
+                  <a:schemeClr val="tx1"/>
+                </a:solidFill>
+                <a:latin typeface="+mn-lt"/>
+                <a:ea typeface="+mn-ea"/>
+                <a:cs typeface="+mn-cs"/>
+              </a:defRPr>
+            </a:lvl4pPr>
+            <a:lvl5pPr marL="1828800" indent="0" algn="ctr" defTabSz="914400" rtl="0" eaLnBrk="1" latinLnBrk="0" hangingPunct="1">
+              <a:lnSpc>
+                <a:spcPct val="90000"/>
+              </a:lnSpc>
+              <a:spcBef>
+                <a:spcPts val="500"/>
+              </a:spcBef>
+              <a:buFont typeface="Arial" panose="020B0604020202020204" pitchFamily="34" charset="0"/>
+              <a:buNone/>
+              <a:defRPr sz="1600" kern="1200">
+                <a:solidFill>
+                  <a:schemeClr val="tx1"/>
+                </a:solidFill>
+                <a:latin typeface="+mn-lt"/>
+                <a:ea typeface="+mn-ea"/>
+                <a:cs typeface="+mn-cs"/>
+              </a:defRPr>
+            </a:lvl5pPr>
+            <a:lvl6pPr marL="2286000" indent="0" algn="ctr" defTabSz="914400" rtl="0" eaLnBrk="1" latinLnBrk="0" hangingPunct="1">
+              <a:lnSpc>
+                <a:spcPct val="90000"/>
+              </a:lnSpc>
+              <a:spcBef>
+                <a:spcPts val="500"/>
+              </a:spcBef>
+              <a:buFont typeface="Arial" panose="020B0604020202020204" pitchFamily="34" charset="0"/>
+              <a:buNone/>
+              <a:defRPr sz="1600" kern="1200">
+                <a:solidFill>
+                  <a:schemeClr val="tx1"/>
+                </a:solidFill>
+                <a:latin typeface="+mn-lt"/>
+                <a:ea typeface="+mn-ea"/>
+                <a:cs typeface="+mn-cs"/>
+              </a:defRPr>
+            </a:lvl6pPr>
+            <a:lvl7pPr marL="2743200" indent="0" algn="ctr" defTabSz="914400" rtl="0" eaLnBrk="1" latinLnBrk="0" hangingPunct="1">
+              <a:lnSpc>
+                <a:spcPct val="90000"/>
+              </a:lnSpc>
+              <a:spcBef>
+                <a:spcPts val="500"/>
+              </a:spcBef>
+              <a:buFont typeface="Arial" panose="020B0604020202020204" pitchFamily="34" charset="0"/>
+              <a:buNone/>
+              <a:defRPr sz="1600" kern="1200">
+                <a:solidFill>
+                  <a:schemeClr val="tx1"/>
+                </a:solidFill>
+                <a:latin typeface="+mn-lt"/>
+                <a:ea typeface="+mn-ea"/>
+                <a:cs typeface="+mn-cs"/>
+              </a:defRPr>
+            </a:lvl7pPr>
+            <a:lvl8pPr marL="3200400" indent="0" algn="ctr" defTabSz="914400" rtl="0" eaLnBrk="1" latinLnBrk="0" hangingPunct="1">
+              <a:lnSpc>
+                <a:spcPct val="90000"/>
+              </a:lnSpc>
+              <a:spcBef>
+                <a:spcPts val="500"/>
+              </a:spcBef>
+              <a:buFont typeface="Arial" panose="020B0604020202020204" pitchFamily="34" charset="0"/>
+              <a:buNone/>
+              <a:defRPr sz="1600" kern="1200">
+                <a:solidFill>
+                  <a:schemeClr val="tx1"/>
+                </a:solidFill>
+                <a:latin typeface="+mn-lt"/>
+                <a:ea typeface="+mn-ea"/>
+                <a:cs typeface="+mn-cs"/>
+              </a:defRPr>
+            </a:lvl8pPr>
+            <a:lvl9pPr marL="3657600" indent="0" algn="ctr" defTabSz="914400" rtl="0" eaLnBrk="1" latinLnBrk="0" hangingPunct="1">
+              <a:lnSpc>
+                <a:spcPct val="90000"/>
+              </a:lnSpc>
+              <a:spcBef>
+                <a:spcPts val="500"/>
+              </a:spcBef>
+              <a:buFont typeface="Arial" panose="020B0604020202020204" pitchFamily="34" charset="0"/>
+              <a:buNone/>
+              <a:defRPr sz="1600" kern="1200">
+                <a:solidFill>
+                  <a:schemeClr val="tx1"/>
+                </a:solidFill>
+                <a:latin typeface="+mn-lt"/>
+                <a:ea typeface="+mn-ea"/>
+                <a:cs typeface="+mn-cs"/>
+              </a:defRPr>
+            </a:lvl9pPr>
+          </a:lstStyle>
+          <a:p>
+            <a:pPr marL="342900" indent="-342900">
+              <a:buFont typeface="Wingdings" panose="05000000000000000000" pitchFamily="2" charset="2"/>
+              <a:buChar char="Ø"/>
+            </a:pPr>
+            <a:r>
+              <a:rPr lang="en-US" b="1" dirty="0">
+                <a:solidFill>
+                  <a:schemeClr val="tx1"/>
+                </a:solidFill>
+              </a:rPr>
               <a:t>Community Module + User Module</a:t>
             </a:r>
           </a:p>
@@ -15030,253 +15728,6 @@
     <p:extLst>
       <p:ext uri="{BB962C8B-B14F-4D97-AF65-F5344CB8AC3E}">
         <p14:creationId xmlns:p14="http://schemas.microsoft.com/office/powerpoint/2010/main" val="1398230855"/>
-      </p:ext>
-    </p:extLst>
-  </p:cSld>
-  <p:clrMapOvr>
-    <a:masterClrMapping/>
-  </p:clrMapOvr>
-</p:sld>
-</file>
-
-<file path=ppt/slides/slide9.xml><?xml version="1.0" encoding="utf-8"?>
-<p:sld xmlns:a="http://schemas.openxmlformats.org/drawingml/2006/main" xmlns:r="http://schemas.openxmlformats.org/officeDocument/2006/relationships" xmlns:p="http://schemas.openxmlformats.org/presentationml/2006/main">
-  <p:cSld>
-    <p:spTree>
-      <p:nvGrpSpPr>
-        <p:cNvPr id="1" name=""/>
-        <p:cNvGrpSpPr/>
-        <p:nvPr/>
-      </p:nvGrpSpPr>
-      <p:grpSpPr>
-        <a:xfrm>
-          <a:off x="0" y="0"/>
-          <a:ext cx="0" cy="0"/>
-          <a:chOff x="0" y="0"/>
-          <a:chExt cx="0" cy="0"/>
-        </a:xfrm>
-      </p:grpSpPr>
-      <p:sp>
-        <p:nvSpPr>
-          <p:cNvPr id="6" name="Content Placeholder 5">
-            <a:extLst>
-              <a:ext uri="{FF2B5EF4-FFF2-40B4-BE49-F238E27FC236}">
-                <a16:creationId xmlns:a16="http://schemas.microsoft.com/office/drawing/2014/main" id="{62FF1654-306D-262A-D360-5E5C2E6B39E3}"/>
-              </a:ext>
-            </a:extLst>
-          </p:cNvPr>
-          <p:cNvSpPr>
-            <a:spLocks noGrp="1"/>
-          </p:cNvSpPr>
-          <p:nvPr>
-            <p:ph sz="quarter" idx="4"/>
-          </p:nvPr>
-        </p:nvSpPr>
-        <p:spPr>
-          <a:xfrm>
-            <a:off x="4746929" y="4842344"/>
-            <a:ext cx="1979874" cy="494665"/>
-          </a:xfrm>
-        </p:spPr>
-        <p:txBody>
-          <a:bodyPr/>
-          <a:lstStyle/>
-          <a:p>
-            <a:r>
-              <a:rPr lang="en-US" dirty="0"/>
-              <a:t> </a:t>
-            </a:r>
-          </a:p>
-        </p:txBody>
-      </p:sp>
-      <p:sp>
-        <p:nvSpPr>
-          <p:cNvPr id="2" name="Title 1">
-            <a:extLst>
-              <a:ext uri="{FF2B5EF4-FFF2-40B4-BE49-F238E27FC236}">
-                <a16:creationId xmlns:a16="http://schemas.microsoft.com/office/drawing/2014/main" id="{88B8FDAA-00CD-846E-A576-B59DFA73F988}"/>
-              </a:ext>
-            </a:extLst>
-          </p:cNvPr>
-          <p:cNvSpPr>
-            <a:spLocks noGrp="1"/>
-          </p:cNvSpPr>
-          <p:nvPr>
-            <p:ph type="title"/>
-          </p:nvPr>
-        </p:nvSpPr>
-        <p:spPr>
-          <a:xfrm>
-            <a:off x="1168842" y="489985"/>
-            <a:ext cx="3267986" cy="647052"/>
-          </a:xfrm>
-        </p:spPr>
-        <p:txBody>
-          <a:bodyPr/>
-          <a:lstStyle/>
-          <a:p>
-            <a:r>
-              <a:rPr lang="en-US" dirty="0"/>
-              <a:t>Results</a:t>
-            </a:r>
-          </a:p>
-        </p:txBody>
-      </p:sp>
-      <p:sp>
-        <p:nvSpPr>
-          <p:cNvPr id="4" name="Content Placeholder 3">
-            <a:extLst>
-              <a:ext uri="{FF2B5EF4-FFF2-40B4-BE49-F238E27FC236}">
-                <a16:creationId xmlns:a16="http://schemas.microsoft.com/office/drawing/2014/main" id="{352B3B4A-6ED2-64D9-BEC7-1B6C66971286}"/>
-              </a:ext>
-            </a:extLst>
-          </p:cNvPr>
-          <p:cNvSpPr>
-            <a:spLocks noGrp="1"/>
-          </p:cNvSpPr>
-          <p:nvPr>
-            <p:ph sz="half" idx="2"/>
-          </p:nvPr>
-        </p:nvSpPr>
-        <p:spPr>
-          <a:xfrm>
-            <a:off x="1121134" y="1580018"/>
-            <a:ext cx="9716494" cy="4916198"/>
-          </a:xfrm>
-        </p:spPr>
-        <p:txBody>
-          <a:bodyPr/>
-          <a:lstStyle/>
-          <a:p>
-            <a:r>
-              <a:rPr lang="en-US" sz="2000" b="1" dirty="0"/>
-              <a:t>Output of Modules :</a:t>
-            </a:r>
-          </a:p>
-          <a:p>
-            <a:pPr marL="285750" indent="-285750">
-              <a:buFont typeface="Wingdings" panose="05000000000000000000" pitchFamily="2" charset="2"/>
-              <a:buChar char="Ø"/>
-            </a:pPr>
-            <a:r>
-              <a:rPr lang="en-US" dirty="0"/>
-              <a:t>User is able to Onboard and Register Himself.</a:t>
-            </a:r>
-          </a:p>
-          <a:p>
-            <a:pPr marL="285750" indent="-285750">
-              <a:buFont typeface="Wingdings" panose="05000000000000000000" pitchFamily="2" charset="2"/>
-              <a:buChar char="Ø"/>
-            </a:pPr>
-            <a:r>
-              <a:rPr lang="en-US" dirty="0"/>
-              <a:t>User is able to Login and Give its Assessment by itself.</a:t>
-            </a:r>
-          </a:p>
-          <a:p>
-            <a:pPr marL="285750" indent="-285750">
-              <a:buFont typeface="Wingdings" panose="05000000000000000000" pitchFamily="2" charset="2"/>
-              <a:buChar char="Ø"/>
-            </a:pPr>
-            <a:r>
-              <a:rPr lang="en-US" dirty="0"/>
-              <a:t>Our App is able to Assess a user dynamically based on their responses.</a:t>
-            </a:r>
-          </a:p>
-          <a:p>
-            <a:pPr marL="285750" indent="-285750">
-              <a:buFont typeface="Wingdings" panose="05000000000000000000" pitchFamily="2" charset="2"/>
-              <a:buChar char="Ø"/>
-            </a:pPr>
-            <a:r>
-              <a:rPr lang="en-US" dirty="0"/>
-              <a:t>A Complete Dashboard for overall and distinct results is there.</a:t>
-            </a:r>
-          </a:p>
-          <a:p>
-            <a:pPr marL="285750" indent="-285750">
-              <a:buFont typeface="Wingdings" panose="05000000000000000000" pitchFamily="2" charset="2"/>
-              <a:buChar char="Ø"/>
-            </a:pPr>
-            <a:r>
-              <a:rPr lang="en-US" dirty="0"/>
-              <a:t>User are able to share their POVs over the community Forum via Small Blogs.</a:t>
-            </a:r>
-          </a:p>
-          <a:p>
-            <a:pPr marL="285750" indent="-285750">
-              <a:buFont typeface="Wingdings" panose="05000000000000000000" pitchFamily="2" charset="2"/>
-              <a:buChar char="Ø"/>
-            </a:pPr>
-            <a:r>
-              <a:rPr lang="en-US" dirty="0"/>
-              <a:t>User is able to handle their profile &amp; able to Logout.</a:t>
-            </a:r>
-          </a:p>
-          <a:p>
-            <a:pPr marL="285750" indent="-285750">
-              <a:buFont typeface="Wingdings" panose="05000000000000000000" pitchFamily="2" charset="2"/>
-              <a:buChar char="Ø"/>
-            </a:pPr>
-            <a:endParaRPr lang="en-US" dirty="0"/>
-          </a:p>
-          <a:p>
-            <a:r>
-              <a:rPr lang="en-US" sz="2000" b="1" dirty="0"/>
-              <a:t>Intermediate Results :</a:t>
-            </a:r>
-          </a:p>
-          <a:p>
-            <a:pPr marL="285750" indent="-285750">
-              <a:buFont typeface="Wingdings" panose="05000000000000000000" pitchFamily="2" charset="2"/>
-              <a:buChar char="Ø"/>
-            </a:pPr>
-            <a:r>
-              <a:rPr lang="en-US" dirty="0"/>
-              <a:t>Successfully able to implement API to generate tasks from DB over thousands of task according to the level of user assessment.</a:t>
-            </a:r>
-          </a:p>
-          <a:p>
-            <a:pPr marL="285750" indent="-285750">
-              <a:buFont typeface="Wingdings" panose="05000000000000000000" pitchFamily="2" charset="2"/>
-              <a:buChar char="Ø"/>
-            </a:pPr>
-            <a:r>
-              <a:rPr lang="en-US" dirty="0"/>
-              <a:t>The Feedback Form is complete from UI </a:t>
-            </a:r>
-            <a:r>
-              <a:rPr lang="en-US" dirty="0" err="1"/>
-              <a:t>persective</a:t>
-            </a:r>
-            <a:r>
-              <a:rPr lang="en-US" dirty="0"/>
-              <a:t>.</a:t>
-            </a:r>
-          </a:p>
-          <a:p>
-            <a:pPr marL="285750" indent="-285750">
-              <a:buFont typeface="Wingdings" panose="05000000000000000000" pitchFamily="2" charset="2"/>
-              <a:buChar char="Ø"/>
-            </a:pPr>
-            <a:r>
-              <a:rPr lang="en-US" dirty="0"/>
-              <a:t>Research Paper is under Development. It is completed 60% - 70%.</a:t>
-            </a:r>
-          </a:p>
-          <a:p>
-            <a:pPr marL="285750" indent="-285750">
-              <a:buFont typeface="Wingdings" panose="05000000000000000000" pitchFamily="2" charset="2"/>
-              <a:buChar char="Ø"/>
-            </a:pPr>
-            <a:endParaRPr lang="en-US" dirty="0"/>
-          </a:p>
-        </p:txBody>
-      </p:sp>
-    </p:spTree>
-    <p:extLst>
-      <p:ext uri="{BB962C8B-B14F-4D97-AF65-F5344CB8AC3E}">
-        <p14:creationId xmlns:p14="http://schemas.microsoft.com/office/powerpoint/2010/main" val="2102816447"/>
       </p:ext>
     </p:extLst>
   </p:cSld>
@@ -16078,35 +16529,6 @@
 </file>
 
 <file path=customXml/item1.xml><?xml version="1.0" encoding="utf-8"?>
-<p:properties xmlns:p="http://schemas.microsoft.com/office/2006/metadata/properties" xmlns:xsi="http://www.w3.org/2001/XMLSchema-instance" xmlns:pc="http://schemas.microsoft.com/office/infopath/2007/PartnerControls">
-  <documentManagement>
-    <_ip_UnifiedCompliancePolicyUIAction xmlns="http://schemas.microsoft.com/sharepoint/v3" xsi:nil="true"/>
-    <Image xmlns="71af3243-3dd4-4a8d-8c0d-dd76da1f02a5">
-      <Url xsi:nil="true"/>
-      <Description xsi:nil="true"/>
-    </Image>
-    <Status xmlns="71af3243-3dd4-4a8d-8c0d-dd76da1f02a5">Not started</Status>
-    <Background xmlns="71af3243-3dd4-4a8d-8c0d-dd76da1f02a5">false</Background>
-    <_ip_UnifiedCompliancePolicyProperties xmlns="http://schemas.microsoft.com/sharepoint/v3" xsi:nil="true"/>
-    <ImageTagsTaxHTField xmlns="71af3243-3dd4-4a8d-8c0d-dd76da1f02a5">
-      <Terms xmlns="http://schemas.microsoft.com/office/infopath/2007/PartnerControls"/>
-    </ImageTagsTaxHTField>
-    <TaxCatchAll xmlns="230e9df3-be65-4c73-a93b-d1236ebd677e" xsi:nil="true"/>
-    <MediaServiceKeyPoints xmlns="71af3243-3dd4-4a8d-8c0d-dd76da1f02a5" xsi:nil="true"/>
-  </documentManagement>
-</p:properties>
-</file>
-
-<file path=customXml/item2.xml><?xml version="1.0" encoding="utf-8"?>
-<?mso-contentType ?>
-<FormTemplates xmlns="http://schemas.microsoft.com/sharepoint/v3/contenttype/forms">
-  <Display>DocumentLibraryForm</Display>
-  <Edit>DocumentLibraryForm</Edit>
-  <New>DocumentLibraryForm</New>
-</FormTemplates>
-</file>
-
-<file path=customXml/item3.xml><?xml version="1.0" encoding="utf-8"?>
 <ct:contentTypeSchema xmlns:ct="http://schemas.microsoft.com/office/2006/metadata/contentType" xmlns:ma="http://schemas.microsoft.com/office/2006/metadata/properties/metaAttributes" ct:_="" ma:_="" ma:contentTypeName="Document" ma:contentTypeID="0x01010079F111ED35F8CC479449609E8A0923A6" ma:contentTypeVersion="28" ma:contentTypeDescription="Create a new document." ma:contentTypeScope="" ma:versionID="60f5a4f2d2b0abadcf532d48ebf9cb71">
   <xsd:schema xmlns:xsd="http://www.w3.org/2001/XMLSchema" xmlns:xs="http://www.w3.org/2001/XMLSchema" xmlns:p="http://schemas.microsoft.com/office/2006/metadata/properties" xmlns:ns1="http://schemas.microsoft.com/sharepoint/v3" xmlns:ns2="71af3243-3dd4-4a8d-8c0d-dd76da1f02a5" xmlns:ns3="16c05727-aa75-4e4a-9b5f-8a80a1165891" xmlns:ns4="230e9df3-be65-4c73-a93b-d1236ebd677e" targetNamespace="http://schemas.microsoft.com/office/2006/metadata/properties" ma:root="true" ma:fieldsID="7dd78129e6a1811f84807ad11c651531" ns1:_="" ns2:_="" ns3:_="" ns4:_="">
     <xsd:import namespace="http://schemas.microsoft.com/sharepoint/v3"/>
@@ -16418,27 +16840,36 @@
 </ct:contentTypeSchema>
 </file>
 
-<file path=customXml/itemProps1.xml><?xml version="1.0" encoding="utf-8"?>
-<ds:datastoreItem xmlns:ds="http://schemas.openxmlformats.org/officeDocument/2006/customXml" ds:itemID="{80E87F72-70BF-43BC-A0D4-53665DC12672}">
-  <ds:schemaRefs>
-    <ds:schemaRef ds:uri="http://schemas.microsoft.com/office/2006/metadata/properties"/>
-    <ds:schemaRef ds:uri="http://schemas.microsoft.com/office/infopath/2007/PartnerControls"/>
-    <ds:schemaRef ds:uri="http://schemas.microsoft.com/sharepoint/v3"/>
-    <ds:schemaRef ds:uri="71af3243-3dd4-4a8d-8c0d-dd76da1f02a5"/>
-    <ds:schemaRef ds:uri="230e9df3-be65-4c73-a93b-d1236ebd677e"/>
-  </ds:schemaRefs>
-</ds:datastoreItem>
+<file path=customXml/item2.xml><?xml version="1.0" encoding="utf-8"?>
+<?mso-contentType ?>
+<FormTemplates xmlns="http://schemas.microsoft.com/sharepoint/v3/contenttype/forms">
+  <Display>DocumentLibraryForm</Display>
+  <Edit>DocumentLibraryForm</Edit>
+  <New>DocumentLibraryForm</New>
+</FormTemplates>
 </file>
 
-<file path=customXml/itemProps2.xml><?xml version="1.0" encoding="utf-8"?>
-<ds:datastoreItem xmlns:ds="http://schemas.openxmlformats.org/officeDocument/2006/customXml" ds:itemID="{FABD9919-8F5A-4B99-83E1-E90FE1DCF2E1}">
-  <ds:schemaRefs>
-    <ds:schemaRef ds:uri="http://schemas.microsoft.com/sharepoint/v3/contenttype/forms"/>
-  </ds:schemaRefs>
-</ds:datastoreItem>
+<file path=customXml/item3.xml><?xml version="1.0" encoding="utf-8"?>
+<p:properties xmlns:p="http://schemas.microsoft.com/office/2006/metadata/properties" xmlns:xsi="http://www.w3.org/2001/XMLSchema-instance" xmlns:pc="http://schemas.microsoft.com/office/infopath/2007/PartnerControls">
+  <documentManagement>
+    <_ip_UnifiedCompliancePolicyUIAction xmlns="http://schemas.microsoft.com/sharepoint/v3" xsi:nil="true"/>
+    <Image xmlns="71af3243-3dd4-4a8d-8c0d-dd76da1f02a5">
+      <Url xsi:nil="true"/>
+      <Description xsi:nil="true"/>
+    </Image>
+    <Status xmlns="71af3243-3dd4-4a8d-8c0d-dd76da1f02a5">Not started</Status>
+    <Background xmlns="71af3243-3dd4-4a8d-8c0d-dd76da1f02a5">false</Background>
+    <_ip_UnifiedCompliancePolicyProperties xmlns="http://schemas.microsoft.com/sharepoint/v3" xsi:nil="true"/>
+    <ImageTagsTaxHTField xmlns="71af3243-3dd4-4a8d-8c0d-dd76da1f02a5">
+      <Terms xmlns="http://schemas.microsoft.com/office/infopath/2007/PartnerControls"/>
+    </ImageTagsTaxHTField>
+    <TaxCatchAll xmlns="230e9df3-be65-4c73-a93b-d1236ebd677e" xsi:nil="true"/>
+    <MediaServiceKeyPoints xmlns="71af3243-3dd4-4a8d-8c0d-dd76da1f02a5" xsi:nil="true"/>
+  </documentManagement>
+</p:properties>
 </file>
 
-<file path=customXml/itemProps3.xml><?xml version="1.0" encoding="utf-8"?>
+<file path=customXml/itemProps1.xml><?xml version="1.0" encoding="utf-8"?>
 <ds:datastoreItem xmlns:ds="http://schemas.openxmlformats.org/officeDocument/2006/customXml" ds:itemID="{52D646E0-DCC8-4209-B539-AA58186B682C}">
   <ds:schemaRefs>
     <ds:schemaRef ds:uri="http://schemas.microsoft.com/office/2006/metadata/contentType"/>
@@ -16459,6 +16890,26 @@
 </ds:datastoreItem>
 </file>
 
+<file path=customXml/itemProps2.xml><?xml version="1.0" encoding="utf-8"?>
+<ds:datastoreItem xmlns:ds="http://schemas.openxmlformats.org/officeDocument/2006/customXml" ds:itemID="{FABD9919-8F5A-4B99-83E1-E90FE1DCF2E1}">
+  <ds:schemaRefs>
+    <ds:schemaRef ds:uri="http://schemas.microsoft.com/sharepoint/v3/contenttype/forms"/>
+  </ds:schemaRefs>
+</ds:datastoreItem>
+</file>
+
+<file path=customXml/itemProps3.xml><?xml version="1.0" encoding="utf-8"?>
+<ds:datastoreItem xmlns:ds="http://schemas.openxmlformats.org/officeDocument/2006/customXml" ds:itemID="{80E87F72-70BF-43BC-A0D4-53665DC12672}">
+  <ds:schemaRefs>
+    <ds:schemaRef ds:uri="http://schemas.microsoft.com/office/2006/metadata/properties"/>
+    <ds:schemaRef ds:uri="http://schemas.microsoft.com/office/infopath/2007/PartnerControls"/>
+    <ds:schemaRef ds:uri="http://schemas.microsoft.com/sharepoint/v3"/>
+    <ds:schemaRef ds:uri="71af3243-3dd4-4a8d-8c0d-dd76da1f02a5"/>
+    <ds:schemaRef ds:uri="230e9df3-be65-4c73-a93b-d1236ebd677e"/>
+  </ds:schemaRefs>
+</ds:datastoreItem>
+</file>
+
 <file path=docMetadata/LabelInfo.xml><?xml version="1.0" encoding="utf-8"?>
 <clbl:labelList xmlns:clbl="http://schemas.microsoft.com/office/2020/mipLabelMetadata"/>
 </file>
</xml_diff>